<commit_message>
update names and dates
</commit_message>
<xml_diff>
--- a/assets/lectures/cshl/2021/mini/RNASeq_MiniLecture_01_01_FASTA_FASTQ_GTF.pptx
+++ b/assets/lectures/cshl/2021/mini/RNASeq_MiniLecture_01_01_FASTA_FASTQ_GTF.pptx
@@ -205,7 +205,7 @@
           <a:p>
             <a:fld id="{827BD9F9-8452-A342-BB1B-28ECF19E2CC5}" type="datetimeFigureOut">
               <a:rPr lang="en-US" smtClean="0"/>
-              <a:t>11/16/20</a:t>
+              <a:t>11/10/21</a:t>
             </a:fld>
             <a:endParaRPr lang="en-US"/>
           </a:p>
@@ -1505,14 +1505,14 @@
           </a:ln>
           <a:extLst>
             <a:ext uri="{909E8E84-426E-40dd-AFC4-6F175D3DCCD1}">
-              <a14:hiddenFill xmlns="" xmlns:a14="http://schemas.microsoft.com/office/drawing/2010/main">
+              <a14:hiddenFill xmlns:a14="http://schemas.microsoft.com/office/drawing/2010/main" xmlns="">
                 <a:solidFill>
                   <a:srgbClr val="FFFFFF"/>
                 </a:solidFill>
               </a14:hiddenFill>
             </a:ext>
             <a:ext uri="{91240B29-F687-4f45-9708-019B960494DF}">
-              <a14:hiddenLine xmlns="" xmlns:a14="http://schemas.microsoft.com/office/drawing/2010/main" w="9525">
+              <a14:hiddenLine xmlns:a14="http://schemas.microsoft.com/office/drawing/2010/main" xmlns="" w="9525">
                 <a:solidFill>
                   <a:srgbClr val="000000"/>
                 </a:solidFill>
@@ -1650,14 +1650,14 @@
           </a:ln>
           <a:extLst>
             <a:ext uri="{909E8E84-426E-40dd-AFC4-6F175D3DCCD1}">
-              <a14:hiddenFill xmlns="" xmlns:a14="http://schemas.microsoft.com/office/drawing/2010/main">
+              <a14:hiddenFill xmlns:a14="http://schemas.microsoft.com/office/drawing/2010/main" xmlns="">
                 <a:solidFill>
                   <a:srgbClr val="FFFFFF"/>
                 </a:solidFill>
               </a14:hiddenFill>
             </a:ext>
             <a:ext uri="{91240B29-F687-4f45-9708-019B960494DF}">
-              <a14:hiddenLine xmlns="" xmlns:a14="http://schemas.microsoft.com/office/drawing/2010/main" w="9525">
+              <a14:hiddenLine xmlns:a14="http://schemas.microsoft.com/office/drawing/2010/main" xmlns="" w="9525">
                 <a:solidFill>
                   <a:srgbClr val="000000"/>
                 </a:solidFill>
@@ -3268,14 +3268,14 @@
           </a:ln>
           <a:extLst>
             <a:ext uri="{909E8E84-426E-40dd-AFC4-6F175D3DCCD1}">
-              <a14:hiddenFill xmlns:a14="http://schemas.microsoft.com/office/drawing/2010/main" xmlns="">
+              <a14:hiddenFill xmlns="" xmlns:a14="http://schemas.microsoft.com/office/drawing/2010/main">
                 <a:solidFill>
                   <a:srgbClr val="FFFFFF"/>
                 </a:solidFill>
               </a14:hiddenFill>
             </a:ext>
             <a:ext uri="{91240B29-F687-4f45-9708-019B960494DF}">
-              <a14:hiddenLine xmlns:a14="http://schemas.microsoft.com/office/drawing/2010/main" xmlns="" w="9525">
+              <a14:hiddenLine xmlns="" xmlns:a14="http://schemas.microsoft.com/office/drawing/2010/main" w="9525">
                 <a:solidFill>
                   <a:srgbClr val="000000"/>
                 </a:solidFill>
@@ -3959,14 +3959,14 @@
           </a:ln>
           <a:extLst>
             <a:ext uri="{909E8E84-426E-40dd-AFC4-6F175D3DCCD1}">
-              <a14:hiddenFill xmlns:a14="http://schemas.microsoft.com/office/drawing/2010/main" xmlns="">
+              <a14:hiddenFill xmlns="" xmlns:a14="http://schemas.microsoft.com/office/drawing/2010/main">
                 <a:solidFill>
                   <a:srgbClr val="FFFFFF"/>
                 </a:solidFill>
               </a14:hiddenFill>
             </a:ext>
             <a:ext uri="{91240B29-F687-4f45-9708-019B960494DF}">
-              <a14:hiddenLine xmlns:a14="http://schemas.microsoft.com/office/drawing/2010/main" xmlns="" w="9525">
+              <a14:hiddenLine xmlns="" xmlns:a14="http://schemas.microsoft.com/office/drawing/2010/main" w="9525">
                 <a:solidFill>
                   <a:srgbClr val="000000"/>
                 </a:solidFill>
@@ -4254,14 +4254,14 @@
           </a:ln>
           <a:extLst>
             <a:ext uri="{909E8E84-426E-40dd-AFC4-6F175D3DCCD1}">
-              <a14:hiddenFill xmlns="" xmlns:a14="http://schemas.microsoft.com/office/drawing/2010/main">
+              <a14:hiddenFill xmlns:a14="http://schemas.microsoft.com/office/drawing/2010/main" xmlns="">
                 <a:solidFill>
                   <a:srgbClr val="FFFFFF"/>
                 </a:solidFill>
               </a14:hiddenFill>
             </a:ext>
             <a:ext uri="{91240B29-F687-4f45-9708-019B960494DF}">
-              <a14:hiddenLine xmlns="" xmlns:a14="http://schemas.microsoft.com/office/drawing/2010/main" w="9525">
+              <a14:hiddenLine xmlns:a14="http://schemas.microsoft.com/office/drawing/2010/main" xmlns="" w="9525">
                 <a:solidFill>
                   <a:srgbClr val="000000"/>
                 </a:solidFill>
@@ -4353,21 +4353,49 @@
                 <a:latin typeface="Calibri"/>
                 <a:cs typeface="Calibri"/>
               </a:rPr>
-              <a:t>John Chamberlin, </a:t>
+              <a:t>Kelsy Cotto, Arpad </a:t>
             </a:r>
             <a:r>
               <a:rPr lang="en-US" sz="1800" dirty="0" err="1">
                 <a:latin typeface="Calibri"/>
                 <a:cs typeface="Calibri"/>
               </a:rPr>
-              <a:t>Kelsy</a:t>
+              <a:t>Danos</a:t>
             </a:r>
             <a:r>
               <a:rPr lang="en-US" sz="1800" dirty="0">
                 <a:latin typeface="Calibri"/>
                 <a:cs typeface="Calibri"/>
               </a:rPr>
-              <a:t> Cotto, Felicia Gomez, Obi Griffith, Malachi Griffith, </a:t>
+              <a:t>, Harriet </a:t>
+            </a:r>
+            <a:r>
+              <a:rPr lang="en-US" sz="1800" dirty="0" err="1">
+                <a:latin typeface="Calibri"/>
+                <a:cs typeface="Calibri"/>
+              </a:rPr>
+              <a:t>Dashnow</a:t>
+            </a:r>
+            <a:r>
+              <a:rPr lang="en-US" sz="1800" dirty="0">
+                <a:latin typeface="Calibri"/>
+                <a:cs typeface="Calibri"/>
+              </a:rPr>
+              <a:t>, Felicia Gomez, Sharon </a:t>
+            </a:r>
+            <a:r>
+              <a:rPr lang="en-US" sz="1800" dirty="0" err="1">
+                <a:latin typeface="Calibri"/>
+                <a:cs typeface="Calibri"/>
+              </a:rPr>
+              <a:t>Freshour</a:t>
+            </a:r>
+            <a:r>
+              <a:rPr lang="en-US" sz="1800" dirty="0">
+                <a:latin typeface="Calibri"/>
+                <a:cs typeface="Calibri"/>
+              </a:rPr>
+              <a:t>, Obi Griffith, </a:t>
             </a:r>
           </a:p>
           <a:p>
@@ -4379,21 +4407,35 @@
                 <a:latin typeface="Calibri"/>
                 <a:cs typeface="Calibri"/>
               </a:rPr>
-              <a:t>Simone Longo, Allegra Petti, Aaron Quinlan, Megan </a:t>
+              <a:t>Malachi Griffith, Jason </a:t>
             </a:r>
             <a:r>
               <a:rPr lang="en-US" sz="1800" dirty="0" err="1">
                 <a:latin typeface="Calibri"/>
                 <a:cs typeface="Calibri"/>
               </a:rPr>
-              <a:t>Richters</a:t>
+              <a:t>Kunisaki</a:t>
             </a:r>
             <a:r>
               <a:rPr lang="en-US" sz="1800" dirty="0">
                 <a:latin typeface="Calibri"/>
                 <a:cs typeface="Calibri"/>
               </a:rPr>
-              <a:t>, Huiming Xia</a:t>
+              <a:t>, Chris Miller, Jonathan </a:t>
+            </a:r>
+            <a:r>
+              <a:rPr lang="en-US" sz="1800" dirty="0" err="1">
+                <a:latin typeface="Calibri"/>
+                <a:cs typeface="Calibri"/>
+              </a:rPr>
+              <a:t>Preall</a:t>
+            </a:r>
+            <a:r>
+              <a:rPr lang="en-US" sz="1800" dirty="0">
+                <a:latin typeface="Calibri"/>
+                <a:cs typeface="Calibri"/>
+              </a:rPr>
+              <a:t>, Aaron Quinlan</a:t>
             </a:r>
           </a:p>
           <a:p>
@@ -4401,7 +4443,7 @@
               <a:defRPr/>
             </a:pPr>
             <a:r>
-              <a:rPr lang="en-US" sz="1800" dirty="0">
+              <a:rPr lang="en-US" sz="1800">
                 <a:ln w="1270">
                   <a:solidFill>
                     <a:schemeClr val="tx1">
@@ -4415,7 +4457,7 @@
               <a:t>Advanced Sequencing Technologies &amp; Bioinformatics Analysis </a:t>
             </a:r>
             <a:r>
-              <a:rPr lang="en-US" sz="1600" dirty="0">
+              <a:rPr lang="en-US" sz="1600">
                 <a:ln w="1270">
                   <a:solidFill>
                     <a:schemeClr val="tx1">
@@ -4426,8 +4468,19 @@
                 <a:latin typeface="Calibri"/>
                 <a:cs typeface="Calibri"/>
               </a:rPr>
-              <a:t>November 16-20, 2020</a:t>
-            </a:r>
+              <a:t>November 11-19, 2021</a:t>
+            </a:r>
+            <a:endParaRPr lang="en-US" sz="1600" dirty="0">
+              <a:ln w="1270">
+                <a:solidFill>
+                  <a:schemeClr val="tx1">
+                    <a:alpha val="38000"/>
+                  </a:schemeClr>
+                </a:solidFill>
+              </a:ln>
+              <a:latin typeface="Calibri"/>
+              <a:cs typeface="Calibri"/>
+            </a:endParaRPr>
           </a:p>
         </p:txBody>
       </p:sp>

</xml_diff>